<commit_message>
Honestly, I've changed text color in PPTX
</commit_message>
<xml_diff>
--- a/Terrifying_Tremendous_Presentation.pptx
+++ b/Terrifying_Tremendous_Presentation.pptx
@@ -104,6 +104,11 @@
       </a:defRPr>
     </a:lvl9pPr>
   </p:defaultTextStyle>
+  <p:extLst>
+    <p:ext uri="{EFAFB233-063F-42B5-8137-9DF3F51BA10A}">
+      <p15:sldGuideLst xmlns:p15="http://schemas.microsoft.com/office/powerpoint/2012/main"/>
+    </p:ext>
+  </p:extLst>
 </p:presentation>
 </file>
 
@@ -3337,13 +3342,22 @@
             <p:ph type="ctrTitle"/>
           </p:nvPr>
         </p:nvSpPr>
-        <p:spPr/>
-        <p:txBody>
-          <a:bodyPr/>
-          <a:lstStyle/>
-          <a:p>
-            <a:r>
-              <a:rPr lang="en-US" dirty="0"/>
+        <p:spPr>
+          <a:xfrm>
+            <a:off x="1524000" y="2092751"/>
+            <a:ext cx="9144000" cy="1417212"/>
+          </a:xfrm>
+        </p:spPr>
+        <p:txBody>
+          <a:bodyPr/>
+          <a:lstStyle/>
+          <a:p>
+            <a:r>
+              <a:rPr lang="en-US" b="1" dirty="0">
+                <a:solidFill>
+                  <a:srgbClr val="0070C0"/>
+                </a:solidFill>
+              </a:rPr>
               <a:t>My way</a:t>
             </a:r>
           </a:p>

</xml_diff>